<commit_message>
variogram R notebook in progess
</commit_message>
<xml_diff>
--- a/Slides/GST_Pract_2022_02_Spatial Correlation and Variogram.pptx
+++ b/Slides/GST_Pract_2022_02_Spatial Correlation and Variogram.pptx
@@ -19,17 +19,17 @@
     <p:sldId id="723" r:id="rId7"/>
     <p:sldId id="702" r:id="rId8"/>
     <p:sldId id="725" r:id="rId9"/>
-    <p:sldId id="716" r:id="rId10"/>
-    <p:sldId id="721" r:id="rId11"/>
-    <p:sldId id="718" r:id="rId12"/>
-    <p:sldId id="724" r:id="rId13"/>
-    <p:sldId id="726" r:id="rId14"/>
-    <p:sldId id="733" r:id="rId15"/>
-    <p:sldId id="728" r:id="rId16"/>
-    <p:sldId id="729" r:id="rId17"/>
-    <p:sldId id="731" r:id="rId18"/>
-    <p:sldId id="732" r:id="rId19"/>
-    <p:sldId id="730" r:id="rId20"/>
+    <p:sldId id="730" r:id="rId10"/>
+    <p:sldId id="716" r:id="rId11"/>
+    <p:sldId id="721" r:id="rId12"/>
+    <p:sldId id="718" r:id="rId13"/>
+    <p:sldId id="724" r:id="rId14"/>
+    <p:sldId id="726" r:id="rId15"/>
+    <p:sldId id="733" r:id="rId16"/>
+    <p:sldId id="728" r:id="rId17"/>
+    <p:sldId id="729" r:id="rId18"/>
+    <p:sldId id="731" r:id="rId19"/>
+    <p:sldId id="732" r:id="rId20"/>
   </p:sldIdLst>
   <p:sldSz cx="9144000" cy="6858000" type="screen4x3"/>
   <p:notesSz cx="6797675" cy="9872663"/>
@@ -1270,7 +1270,7 @@
     </p:spTree>
     <p:extLst>
       <p:ext uri="{BB962C8B-B14F-4D97-AF65-F5344CB8AC3E}">
-        <p14:creationId xmlns:p14="http://schemas.microsoft.com/office/powerpoint/2010/main" val="2543101298"/>
+        <p14:creationId xmlns:p14="http://schemas.microsoft.com/office/powerpoint/2010/main" val="2233127284"/>
       </p:ext>
     </p:extLst>
   </p:cSld>
@@ -1360,7 +1360,7 @@
     </p:spTree>
     <p:extLst>
       <p:ext uri="{BB962C8B-B14F-4D97-AF65-F5344CB8AC3E}">
-        <p14:creationId xmlns:p14="http://schemas.microsoft.com/office/powerpoint/2010/main" val="658179927"/>
+        <p14:creationId xmlns:p14="http://schemas.microsoft.com/office/powerpoint/2010/main" val="2543101298"/>
       </p:ext>
     </p:extLst>
   </p:cSld>
@@ -1450,7 +1450,7 @@
     </p:spTree>
     <p:extLst>
       <p:ext uri="{BB962C8B-B14F-4D97-AF65-F5344CB8AC3E}">
-        <p14:creationId xmlns:p14="http://schemas.microsoft.com/office/powerpoint/2010/main" val="2858860006"/>
+        <p14:creationId xmlns:p14="http://schemas.microsoft.com/office/powerpoint/2010/main" val="658179927"/>
       </p:ext>
     </p:extLst>
   </p:cSld>
@@ -1540,7 +1540,7 @@
     </p:spTree>
     <p:extLst>
       <p:ext uri="{BB962C8B-B14F-4D97-AF65-F5344CB8AC3E}">
-        <p14:creationId xmlns:p14="http://schemas.microsoft.com/office/powerpoint/2010/main" val="2385975610"/>
+        <p14:creationId xmlns:p14="http://schemas.microsoft.com/office/powerpoint/2010/main" val="2858860006"/>
       </p:ext>
     </p:extLst>
   </p:cSld>
@@ -1630,7 +1630,7 @@
     </p:spTree>
     <p:extLst>
       <p:ext uri="{BB962C8B-B14F-4D97-AF65-F5344CB8AC3E}">
-        <p14:creationId xmlns:p14="http://schemas.microsoft.com/office/powerpoint/2010/main" val="1185422419"/>
+        <p14:creationId xmlns:p14="http://schemas.microsoft.com/office/powerpoint/2010/main" val="2385975610"/>
       </p:ext>
     </p:extLst>
   </p:cSld>
@@ -1720,7 +1720,7 @@
     </p:spTree>
     <p:extLst>
       <p:ext uri="{BB962C8B-B14F-4D97-AF65-F5344CB8AC3E}">
-        <p14:creationId xmlns:p14="http://schemas.microsoft.com/office/powerpoint/2010/main" val="648778149"/>
+        <p14:creationId xmlns:p14="http://schemas.microsoft.com/office/powerpoint/2010/main" val="1185422419"/>
       </p:ext>
     </p:extLst>
   </p:cSld>
@@ -1810,7 +1810,7 @@
     </p:spTree>
     <p:extLst>
       <p:ext uri="{BB962C8B-B14F-4D97-AF65-F5344CB8AC3E}">
-        <p14:creationId xmlns:p14="http://schemas.microsoft.com/office/powerpoint/2010/main" val="3611301379"/>
+        <p14:creationId xmlns:p14="http://schemas.microsoft.com/office/powerpoint/2010/main" val="648778149"/>
       </p:ext>
     </p:extLst>
   </p:cSld>
@@ -1900,7 +1900,7 @@
     </p:spTree>
     <p:extLst>
       <p:ext uri="{BB962C8B-B14F-4D97-AF65-F5344CB8AC3E}">
-        <p14:creationId xmlns:p14="http://schemas.microsoft.com/office/powerpoint/2010/main" val="1231753276"/>
+        <p14:creationId xmlns:p14="http://schemas.microsoft.com/office/powerpoint/2010/main" val="3611301379"/>
       </p:ext>
     </p:extLst>
   </p:cSld>
@@ -1990,7 +1990,7 @@
     </p:spTree>
     <p:extLst>
       <p:ext uri="{BB962C8B-B14F-4D97-AF65-F5344CB8AC3E}">
-        <p14:creationId xmlns:p14="http://schemas.microsoft.com/office/powerpoint/2010/main" val="3205472444"/>
+        <p14:creationId xmlns:p14="http://schemas.microsoft.com/office/powerpoint/2010/main" val="1231753276"/>
       </p:ext>
     </p:extLst>
   </p:cSld>
@@ -2080,7 +2080,7 @@
     </p:spTree>
     <p:extLst>
       <p:ext uri="{BB962C8B-B14F-4D97-AF65-F5344CB8AC3E}">
-        <p14:creationId xmlns:p14="http://schemas.microsoft.com/office/powerpoint/2010/main" val="3727685717"/>
+        <p14:creationId xmlns:p14="http://schemas.microsoft.com/office/powerpoint/2010/main" val="3205472444"/>
       </p:ext>
     </p:extLst>
   </p:cSld>
@@ -2800,7 +2800,7 @@
     </p:spTree>
     <p:extLst>
       <p:ext uri="{BB962C8B-B14F-4D97-AF65-F5344CB8AC3E}">
-        <p14:creationId xmlns:p14="http://schemas.microsoft.com/office/powerpoint/2010/main" val="2233127284"/>
+        <p14:creationId xmlns:p14="http://schemas.microsoft.com/office/powerpoint/2010/main" val="3727685717"/>
       </p:ext>
     </p:extLst>
   </p:cSld>
@@ -4342,6 +4342,621 @@
                   <a:srgbClr val="333333"/>
                 </a:solidFill>
               </a:rPr>
+              <a:t> variogram</a:t>
+            </a:r>
+          </a:p>
+        </p:txBody>
+      </p:sp>
+      <p:sp>
+        <p:nvSpPr>
+          <p:cNvPr id="18" name="Footer Placeholder 4"/>
+          <p:cNvSpPr txBox="1">
+            <a:spLocks/>
+          </p:cNvSpPr>
+          <p:nvPr/>
+        </p:nvSpPr>
+        <p:spPr>
+          <a:xfrm rot="16200000">
+            <a:off x="7587456" y="4048919"/>
+            <a:ext cx="2366963" cy="365125"/>
+          </a:xfrm>
+          <a:prstGeom prst="rect">
+            <a:avLst/>
+          </a:prstGeom>
+        </p:spPr>
+        <p:txBody>
+          <a:bodyPr vert="horz" lIns="91440" tIns="45720" rIns="91440" bIns="45720" rtlCol="0" anchor="ctr"/>
+          <a:lstStyle>
+            <a:defPPr>
+              <a:defRPr lang="fr-BE"/>
+            </a:defPPr>
+            <a:lvl1pPr algn="ctr" rtl="0" fontAlgn="base">
+              <a:spcBef>
+                <a:spcPct val="0"/>
+              </a:spcBef>
+              <a:spcAft>
+                <a:spcPct val="0"/>
+              </a:spcAft>
+              <a:defRPr sz="1200" kern="1200" dirty="0" smtClean="0">
+                <a:solidFill>
+                  <a:schemeClr val="bg2"/>
+                </a:solidFill>
+                <a:latin typeface="Arial" charset="0"/>
+                <a:ea typeface="+mn-ea"/>
+                <a:cs typeface="Arial" charset="0"/>
+              </a:defRPr>
+            </a:lvl1pPr>
+            <a:lvl2pPr marL="457200" algn="ctr" rtl="0" fontAlgn="base">
+              <a:spcBef>
+                <a:spcPct val="0"/>
+              </a:spcBef>
+              <a:spcAft>
+                <a:spcPct val="0"/>
+              </a:spcAft>
+              <a:defRPr kern="1200">
+                <a:solidFill>
+                  <a:schemeClr val="tx1"/>
+                </a:solidFill>
+                <a:latin typeface="Arial" charset="0"/>
+                <a:ea typeface="+mn-ea"/>
+                <a:cs typeface="Arial" charset="0"/>
+              </a:defRPr>
+            </a:lvl2pPr>
+            <a:lvl3pPr marL="914400" algn="ctr" rtl="0" fontAlgn="base">
+              <a:spcBef>
+                <a:spcPct val="0"/>
+              </a:spcBef>
+              <a:spcAft>
+                <a:spcPct val="0"/>
+              </a:spcAft>
+              <a:defRPr kern="1200">
+                <a:solidFill>
+                  <a:schemeClr val="tx1"/>
+                </a:solidFill>
+                <a:latin typeface="Arial" charset="0"/>
+                <a:ea typeface="+mn-ea"/>
+                <a:cs typeface="Arial" charset="0"/>
+              </a:defRPr>
+            </a:lvl3pPr>
+            <a:lvl4pPr marL="1371600" algn="ctr" rtl="0" fontAlgn="base">
+              <a:spcBef>
+                <a:spcPct val="0"/>
+              </a:spcBef>
+              <a:spcAft>
+                <a:spcPct val="0"/>
+              </a:spcAft>
+              <a:defRPr kern="1200">
+                <a:solidFill>
+                  <a:schemeClr val="tx1"/>
+                </a:solidFill>
+                <a:latin typeface="Arial" charset="0"/>
+                <a:ea typeface="+mn-ea"/>
+                <a:cs typeface="Arial" charset="0"/>
+              </a:defRPr>
+            </a:lvl4pPr>
+            <a:lvl5pPr marL="1828800" algn="ctr" rtl="0" fontAlgn="base">
+              <a:spcBef>
+                <a:spcPct val="0"/>
+              </a:spcBef>
+              <a:spcAft>
+                <a:spcPct val="0"/>
+              </a:spcAft>
+              <a:defRPr kern="1200">
+                <a:solidFill>
+                  <a:schemeClr val="tx1"/>
+                </a:solidFill>
+                <a:latin typeface="Arial" charset="0"/>
+                <a:ea typeface="+mn-ea"/>
+                <a:cs typeface="Arial" charset="0"/>
+              </a:defRPr>
+            </a:lvl5pPr>
+            <a:lvl6pPr marL="2286000" algn="l" defTabSz="914400" rtl="0" eaLnBrk="1" latinLnBrk="0" hangingPunct="1">
+              <a:defRPr kern="1200">
+                <a:solidFill>
+                  <a:schemeClr val="tx1"/>
+                </a:solidFill>
+                <a:latin typeface="Arial" charset="0"/>
+                <a:ea typeface="+mn-ea"/>
+                <a:cs typeface="Arial" charset="0"/>
+              </a:defRPr>
+            </a:lvl6pPr>
+            <a:lvl7pPr marL="2743200" algn="l" defTabSz="914400" rtl="0" eaLnBrk="1" latinLnBrk="0" hangingPunct="1">
+              <a:defRPr kern="1200">
+                <a:solidFill>
+                  <a:schemeClr val="tx1"/>
+                </a:solidFill>
+                <a:latin typeface="Arial" charset="0"/>
+                <a:ea typeface="+mn-ea"/>
+                <a:cs typeface="Arial" charset="0"/>
+              </a:defRPr>
+            </a:lvl7pPr>
+            <a:lvl8pPr marL="3200400" algn="l" defTabSz="914400" rtl="0" eaLnBrk="1" latinLnBrk="0" hangingPunct="1">
+              <a:defRPr kern="1200">
+                <a:solidFill>
+                  <a:schemeClr val="tx1"/>
+                </a:solidFill>
+                <a:latin typeface="Arial" charset="0"/>
+                <a:ea typeface="+mn-ea"/>
+                <a:cs typeface="Arial" charset="0"/>
+              </a:defRPr>
+            </a:lvl8pPr>
+            <a:lvl9pPr marL="3657600" algn="l" defTabSz="914400" rtl="0" eaLnBrk="1" latinLnBrk="0" hangingPunct="1">
+              <a:defRPr kern="1200">
+                <a:solidFill>
+                  <a:schemeClr val="tx1"/>
+                </a:solidFill>
+                <a:latin typeface="Arial" charset="0"/>
+                <a:ea typeface="+mn-ea"/>
+                <a:cs typeface="Arial" charset="0"/>
+              </a:defRPr>
+            </a:lvl9pPr>
+          </a:lstStyle>
+          <a:p>
+            <a:pPr>
+              <a:defRPr/>
+            </a:pPr>
+            <a:r>
+              <a:rPr lang="fr-FR" dirty="0" err="1"/>
+              <a:t>Geostatistics</a:t>
+            </a:r>
+            <a:endParaRPr lang="fr-FR" dirty="0"/>
+          </a:p>
+        </p:txBody>
+      </p:sp>
+      <p:sp>
+        <p:nvSpPr>
+          <p:cNvPr id="5" name="Rectangle 3">
+            <a:extLst>
+              <a:ext uri="{FF2B5EF4-FFF2-40B4-BE49-F238E27FC236}">
+                <a16:creationId xmlns:a16="http://schemas.microsoft.com/office/drawing/2014/main" id="{E7739599-31B2-8529-E3D6-E74211E6C371}"/>
+              </a:ext>
+            </a:extLst>
+          </p:cNvPr>
+          <p:cNvSpPr txBox="1">
+            <a:spLocks noChangeArrowheads="1"/>
+          </p:cNvSpPr>
+          <p:nvPr/>
+        </p:nvSpPr>
+        <p:spPr bwMode="auto">
+          <a:xfrm>
+            <a:off x="0" y="1649896"/>
+            <a:ext cx="8408504" cy="4800600"/>
+          </a:xfrm>
+          <a:prstGeom prst="rect">
+            <a:avLst/>
+          </a:prstGeom>
+          <a:noFill/>
+          <a:ln>
+            <a:noFill/>
+          </a:ln>
+          <a:extLst>
+            <a:ext uri="{909E8E84-426E-40DD-AFC4-6F175D3DCCD1}">
+              <a14:hiddenFill xmlns:a14="http://schemas.microsoft.com/office/drawing/2010/main">
+                <a:solidFill>
+                  <a:srgbClr val="FFFFFF"/>
+                </a:solidFill>
+              </a14:hiddenFill>
+            </a:ext>
+            <a:ext uri="{91240B29-F687-4F45-9708-019B960494DF}">
+              <a14:hiddenLine xmlns:a14="http://schemas.microsoft.com/office/drawing/2010/main" w="9525">
+                <a:solidFill>
+                  <a:srgbClr val="000000"/>
+                </a:solidFill>
+                <a:miter lim="800000"/>
+                <a:headEnd/>
+                <a:tailEnd/>
+              </a14:hiddenLine>
+            </a:ext>
+          </a:extLst>
+        </p:spPr>
+        <p:txBody>
+          <a:bodyPr vert="horz" wrap="square" lIns="91440" tIns="45720" rIns="91440" bIns="45720" numCol="1" anchor="t" anchorCtr="0" compatLnSpc="1">
+            <a:prstTxWarp prst="textNoShape">
+              <a:avLst/>
+            </a:prstTxWarp>
+          </a:bodyPr>
+          <a:lstStyle>
+            <a:lvl1pPr marL="342900" indent="-228600" algn="l" rtl="0" eaLnBrk="1" fontAlgn="base" hangingPunct="1">
+              <a:spcBef>
+                <a:spcPct val="20000"/>
+              </a:spcBef>
+              <a:spcAft>
+                <a:spcPct val="0"/>
+              </a:spcAft>
+              <a:buClr>
+                <a:schemeClr val="accent1"/>
+              </a:buClr>
+              <a:buFont typeface="Arial" charset="0"/>
+              <a:buChar char="•"/>
+              <a:defRPr sz="2200" kern="1200">
+                <a:solidFill>
+                  <a:schemeClr val="tx1"/>
+                </a:solidFill>
+                <a:latin typeface="+mn-lt"/>
+                <a:ea typeface="+mn-ea"/>
+                <a:cs typeface="+mn-cs"/>
+              </a:defRPr>
+            </a:lvl1pPr>
+            <a:lvl2pPr marL="639763" indent="-228600" algn="l" rtl="0" eaLnBrk="1" fontAlgn="base" hangingPunct="1">
+              <a:spcBef>
+                <a:spcPct val="20000"/>
+              </a:spcBef>
+              <a:spcAft>
+                <a:spcPct val="0"/>
+              </a:spcAft>
+              <a:buClr>
+                <a:schemeClr val="accent2"/>
+              </a:buClr>
+              <a:buFont typeface="Arial" charset="0"/>
+              <a:buChar char="•"/>
+              <a:defRPr sz="2000" kern="1200">
+                <a:solidFill>
+                  <a:schemeClr val="tx2">
+                    <a:lumMod val="75000"/>
+                    <a:lumOff val="25000"/>
+                  </a:schemeClr>
+                </a:solidFill>
+                <a:latin typeface="+mn-lt"/>
+                <a:ea typeface="+mn-ea"/>
+                <a:cs typeface="+mn-cs"/>
+              </a:defRPr>
+            </a:lvl2pPr>
+            <a:lvl3pPr marL="1004888" indent="-228600" algn="l" rtl="0" eaLnBrk="1" fontAlgn="base" hangingPunct="1">
+              <a:spcBef>
+                <a:spcPct val="20000"/>
+              </a:spcBef>
+              <a:spcAft>
+                <a:spcPct val="0"/>
+              </a:spcAft>
+              <a:buClr>
+                <a:srgbClr val="D2CB6C"/>
+              </a:buClr>
+              <a:buFont typeface="Arial" charset="0"/>
+              <a:buChar char="•"/>
+              <a:defRPr kern="1200">
+                <a:solidFill>
+                  <a:schemeClr val="accent6">
+                    <a:lumMod val="75000"/>
+                  </a:schemeClr>
+                </a:solidFill>
+                <a:latin typeface="+mn-lt"/>
+                <a:ea typeface="+mn-ea"/>
+                <a:cs typeface="+mn-cs"/>
+              </a:defRPr>
+            </a:lvl3pPr>
+            <a:lvl4pPr marL="1279525" indent="-228600" algn="l" rtl="0" eaLnBrk="1" fontAlgn="base" hangingPunct="1">
+              <a:spcBef>
+                <a:spcPct val="20000"/>
+              </a:spcBef>
+              <a:spcAft>
+                <a:spcPct val="0"/>
+              </a:spcAft>
+              <a:buClr>
+                <a:srgbClr val="95A39D"/>
+              </a:buClr>
+              <a:buFont typeface="Arial" charset="0"/>
+              <a:buChar char="•"/>
+              <a:defRPr sz="1600" kern="1200">
+                <a:solidFill>
+                  <a:schemeClr val="accent5">
+                    <a:lumMod val="75000"/>
+                  </a:schemeClr>
+                </a:solidFill>
+                <a:latin typeface="+mn-lt"/>
+                <a:ea typeface="+mn-ea"/>
+                <a:cs typeface="+mn-cs"/>
+              </a:defRPr>
+            </a:lvl4pPr>
+            <a:lvl5pPr marL="1554163" indent="-228600" algn="l" rtl="0" eaLnBrk="1" fontAlgn="base" hangingPunct="1">
+              <a:spcBef>
+                <a:spcPct val="20000"/>
+              </a:spcBef>
+              <a:spcAft>
+                <a:spcPct val="0"/>
+              </a:spcAft>
+              <a:buClr>
+                <a:srgbClr val="C89F5D"/>
+              </a:buClr>
+              <a:buFont typeface="Arial" charset="0"/>
+              <a:buChar char="•"/>
+              <a:defRPr sz="1400" i="1" kern="1200">
+                <a:solidFill>
+                  <a:schemeClr val="accent6">
+                    <a:lumMod val="75000"/>
+                  </a:schemeClr>
+                </a:solidFill>
+                <a:latin typeface="+mn-lt"/>
+                <a:ea typeface="+mn-ea"/>
+                <a:cs typeface="+mn-cs"/>
+              </a:defRPr>
+            </a:lvl5pPr>
+            <a:lvl6pPr marL="1737360" indent="-182880" algn="l" defTabSz="914400" rtl="0" eaLnBrk="1" latinLnBrk="0" hangingPunct="1">
+              <a:spcBef>
+                <a:spcPct val="20000"/>
+              </a:spcBef>
+              <a:buClr>
+                <a:schemeClr val="accent1"/>
+              </a:buClr>
+              <a:buFont typeface="Arial" pitchFamily="34" charset="0"/>
+              <a:buChar char="•"/>
+              <a:defRPr sz="1400" kern="1200" baseline="0">
+                <a:solidFill>
+                  <a:schemeClr val="tx1"/>
+                </a:solidFill>
+                <a:latin typeface="+mn-lt"/>
+                <a:ea typeface="+mn-ea"/>
+                <a:cs typeface="+mn-cs"/>
+              </a:defRPr>
+            </a:lvl6pPr>
+            <a:lvl7pPr marL="1920240" indent="-182880" algn="l" defTabSz="914400" rtl="0" eaLnBrk="1" latinLnBrk="0" hangingPunct="1">
+              <a:spcBef>
+                <a:spcPct val="20000"/>
+              </a:spcBef>
+              <a:buClr>
+                <a:schemeClr val="accent2"/>
+              </a:buClr>
+              <a:buFont typeface="Arial" pitchFamily="34" charset="0"/>
+              <a:buChar char="•"/>
+              <a:defRPr sz="1400" kern="1200">
+                <a:solidFill>
+                  <a:schemeClr val="tx1"/>
+                </a:solidFill>
+                <a:latin typeface="+mn-lt"/>
+                <a:ea typeface="+mn-ea"/>
+                <a:cs typeface="+mn-cs"/>
+              </a:defRPr>
+            </a:lvl7pPr>
+            <a:lvl8pPr marL="2103120" indent="-182880" algn="l" defTabSz="914400" rtl="0" eaLnBrk="1" latinLnBrk="0" hangingPunct="1">
+              <a:spcBef>
+                <a:spcPct val="20000"/>
+              </a:spcBef>
+              <a:buClr>
+                <a:schemeClr val="accent3"/>
+              </a:buClr>
+              <a:buFont typeface="Arial" pitchFamily="34" charset="0"/>
+              <a:buChar char="•"/>
+              <a:defRPr sz="1400" kern="1200">
+                <a:solidFill>
+                  <a:schemeClr val="tx1"/>
+                </a:solidFill>
+                <a:latin typeface="+mn-lt"/>
+                <a:ea typeface="+mn-ea"/>
+                <a:cs typeface="+mn-cs"/>
+              </a:defRPr>
+            </a:lvl8pPr>
+            <a:lvl9pPr marL="2286000" indent="-182880" algn="l" defTabSz="914400" rtl="0" eaLnBrk="1" latinLnBrk="0" hangingPunct="1">
+              <a:spcBef>
+                <a:spcPct val="20000"/>
+              </a:spcBef>
+              <a:buClr>
+                <a:schemeClr val="accent4"/>
+              </a:buClr>
+              <a:buFont typeface="Arial" pitchFamily="34" charset="0"/>
+              <a:buChar char="•"/>
+              <a:defRPr sz="1400" kern="1200">
+                <a:solidFill>
+                  <a:schemeClr val="tx1"/>
+                </a:solidFill>
+                <a:latin typeface="+mn-lt"/>
+                <a:ea typeface="+mn-ea"/>
+                <a:cs typeface="+mn-cs"/>
+              </a:defRPr>
+            </a:lvl9pPr>
+          </a:lstStyle>
+          <a:p>
+            <a:r>
+              <a:rPr lang="fr-FR" altLang="fr-FR" dirty="0" err="1"/>
+              <a:t>We</a:t>
+            </a:r>
+            <a:r>
+              <a:rPr lang="fr-FR" altLang="fr-FR" dirty="0"/>
+              <a:t> </a:t>
+            </a:r>
+            <a:r>
+              <a:rPr lang="fr-FR" altLang="fr-FR" dirty="0" err="1"/>
+              <a:t>don’t</a:t>
+            </a:r>
+            <a:r>
+              <a:rPr lang="fr-FR" altLang="fr-FR" dirty="0"/>
+              <a:t> have </a:t>
+            </a:r>
+            <a:r>
+              <a:rPr lang="fr-FR" altLang="fr-FR" dirty="0" err="1"/>
+              <a:t>enough</a:t>
+            </a:r>
+            <a:r>
+              <a:rPr lang="fr-FR" altLang="fr-FR" dirty="0"/>
+              <a:t> data pairs at a </a:t>
+            </a:r>
+            <a:r>
+              <a:rPr lang="fr-FR" altLang="fr-FR" dirty="0" err="1"/>
+              <a:t>given</a:t>
+            </a:r>
+            <a:r>
+              <a:rPr lang="fr-FR" altLang="fr-FR" dirty="0"/>
+              <a:t> distance and in a </a:t>
+            </a:r>
+            <a:r>
+              <a:rPr lang="fr-FR" altLang="fr-FR" dirty="0" err="1"/>
+              <a:t>given</a:t>
+            </a:r>
+            <a:r>
+              <a:rPr lang="fr-FR" altLang="fr-FR" dirty="0"/>
+              <a:t> direction, </a:t>
+            </a:r>
+            <a:r>
+              <a:rPr lang="fr-FR" altLang="fr-FR" dirty="0" err="1"/>
+              <a:t>Hence</a:t>
+            </a:r>
+            <a:r>
+              <a:rPr lang="fr-FR" altLang="fr-FR" dirty="0"/>
+              <a:t> </a:t>
+            </a:r>
+            <a:r>
+              <a:rPr lang="fr-FR" altLang="fr-FR" dirty="0" err="1"/>
+              <a:t>we</a:t>
+            </a:r>
+            <a:r>
+              <a:rPr lang="fr-FR" altLang="fr-FR" dirty="0"/>
+              <a:t> </a:t>
+            </a:r>
+            <a:r>
+              <a:rPr lang="fr-FR" altLang="fr-FR" dirty="0" err="1"/>
+              <a:t>create</a:t>
+            </a:r>
+            <a:r>
+              <a:rPr lang="fr-FR" altLang="fr-FR" dirty="0"/>
+              <a:t> classes </a:t>
+            </a:r>
+            <a:r>
+              <a:rPr lang="fr-FR" altLang="fr-FR" dirty="0" err="1"/>
+              <a:t>with</a:t>
+            </a:r>
+            <a:r>
+              <a:rPr lang="fr-FR" altLang="fr-FR" dirty="0"/>
+              <a:t> </a:t>
+            </a:r>
+            <a:r>
+              <a:rPr lang="fr-FR" altLang="fr-FR" dirty="0" err="1"/>
+              <a:t>some</a:t>
+            </a:r>
+            <a:r>
+              <a:rPr lang="fr-FR" altLang="fr-FR" dirty="0"/>
+              <a:t> </a:t>
+            </a:r>
+            <a:r>
+              <a:rPr lang="fr-FR" altLang="fr-FR" dirty="0" err="1"/>
+              <a:t>tolerance</a:t>
+            </a:r>
+            <a:endParaRPr lang="fr-FR" altLang="fr-FR" dirty="0"/>
+          </a:p>
+        </p:txBody>
+      </p:sp>
+      <p:pic>
+        <p:nvPicPr>
+          <p:cNvPr id="7" name="Picture 2">
+            <a:extLst>
+              <a:ext uri="{FF2B5EF4-FFF2-40B4-BE49-F238E27FC236}">
+                <a16:creationId xmlns:a16="http://schemas.microsoft.com/office/drawing/2014/main" id="{7FBF29B5-69AD-DF39-FAB5-50AC756C4EF5}"/>
+              </a:ext>
+            </a:extLst>
+          </p:cNvPr>
+          <p:cNvPicPr>
+            <a:picLocks noChangeAspect="1" noChangeArrowheads="1"/>
+          </p:cNvPicPr>
+          <p:nvPr/>
+        </p:nvPicPr>
+        <p:blipFill rotWithShape="1">
+          <a:blip r:embed="rId3">
+            <a:extLst>
+              <a:ext uri="{28A0092B-C50C-407E-A947-70E740481C1C}">
+                <a14:useLocalDpi xmlns:a14="http://schemas.microsoft.com/office/drawing/2010/main" val="0"/>
+              </a:ext>
+            </a:extLst>
+          </a:blip>
+          <a:srcRect t="4883" b="6084"/>
+          <a:stretch/>
+        </p:blipFill>
+        <p:spPr bwMode="auto">
+          <a:xfrm>
+            <a:off x="1428809" y="2475128"/>
+            <a:ext cx="5769198" cy="4382872"/>
+          </a:xfrm>
+          <a:prstGeom prst="rect">
+            <a:avLst/>
+          </a:prstGeom>
+          <a:noFill/>
+          <a:ln>
+            <a:noFill/>
+          </a:ln>
+          <a:extLst>
+            <a:ext uri="{909E8E84-426E-40DD-AFC4-6F175D3DCCD1}">
+              <a14:hiddenFill xmlns:a14="http://schemas.microsoft.com/office/drawing/2010/main">
+                <a:solidFill>
+                  <a:schemeClr val="accent1"/>
+                </a:solidFill>
+              </a14:hiddenFill>
+            </a:ext>
+            <a:ext uri="{91240B29-F687-4F45-9708-019B960494DF}">
+              <a14:hiddenLine xmlns:a14="http://schemas.microsoft.com/office/drawing/2010/main" w="9525">
+                <a:solidFill>
+                  <a:schemeClr val="tx1"/>
+                </a:solidFill>
+                <a:miter lim="800000"/>
+                <a:headEnd/>
+                <a:tailEnd/>
+              </a14:hiddenLine>
+            </a:ext>
+          </a:extLst>
+        </p:spPr>
+      </p:pic>
+    </p:spTree>
+    <p:extLst>
+      <p:ext uri="{BB962C8B-B14F-4D97-AF65-F5344CB8AC3E}">
+        <p14:creationId xmlns:p14="http://schemas.microsoft.com/office/powerpoint/2010/main" val="1775445024"/>
+      </p:ext>
+    </p:extLst>
+  </p:cSld>
+  <p:clrMapOvr>
+    <a:masterClrMapping/>
+  </p:clrMapOvr>
+  <p:transition spd="med">
+    <p:strips dir="rd"/>
+  </p:transition>
+</p:sld>
+</file>
+
+<file path=ppt/slides/slide11.xml><?xml version="1.0" encoding="utf-8"?>
+<p:sld xmlns:a="http://schemas.openxmlformats.org/drawingml/2006/main" xmlns:r="http://schemas.openxmlformats.org/officeDocument/2006/relationships" xmlns:p="http://schemas.openxmlformats.org/presentationml/2006/main">
+  <p:cSld>
+    <p:spTree>
+      <p:nvGrpSpPr>
+        <p:cNvPr id="1" name=""/>
+        <p:cNvGrpSpPr/>
+        <p:nvPr/>
+      </p:nvGrpSpPr>
+      <p:grpSpPr>
+        <a:xfrm>
+          <a:off x="0" y="0"/>
+          <a:ext cx="0" cy="0"/>
+          <a:chOff x="0" y="0"/>
+          <a:chExt cx="0" cy="0"/>
+        </a:xfrm>
+      </p:grpSpPr>
+      <p:sp>
+        <p:nvSpPr>
+          <p:cNvPr id="2" name="Titre 1"/>
+          <p:cNvSpPr>
+            <a:spLocks noGrp="1"/>
+          </p:cNvSpPr>
+          <p:nvPr>
+            <p:ph type="title"/>
+          </p:nvPr>
+        </p:nvSpPr>
+        <p:spPr>
+          <a:xfrm>
+            <a:off x="457200" y="274638"/>
+            <a:ext cx="7620000" cy="1143000"/>
+          </a:xfrm>
+        </p:spPr>
+        <p:txBody>
+          <a:bodyPr/>
+          <a:lstStyle/>
+          <a:p>
+            <a:r>
+              <a:rPr lang="pt-BR" altLang="pt-BR" sz="4800" dirty="0" err="1">
+                <a:solidFill>
+                  <a:srgbClr val="333333"/>
+                </a:solidFill>
+              </a:rPr>
+              <a:t>Directional</a:t>
+            </a:r>
+            <a:r>
+              <a:rPr lang="pt-BR" altLang="pt-BR" sz="4800" dirty="0">
+                <a:solidFill>
+                  <a:srgbClr val="333333"/>
+                </a:solidFill>
+              </a:rPr>
               <a:t> Variogram</a:t>
             </a:r>
           </a:p>
@@ -5304,7 +5919,7 @@
 </p:sld>
 </file>
 
-<file path=ppt/slides/slide11.xml><?xml version="1.0" encoding="utf-8"?>
+<file path=ppt/slides/slide12.xml><?xml version="1.0" encoding="utf-8"?>
 <p:sld xmlns:a="http://schemas.openxmlformats.org/drawingml/2006/main" xmlns:r="http://schemas.openxmlformats.org/officeDocument/2006/relationships" xmlns:p="http://schemas.openxmlformats.org/presentationml/2006/main">
   <p:cSld>
     <p:spTree>
@@ -5585,7 +6200,7 @@
 </p:sld>
 </file>
 
-<file path=ppt/slides/slide12.xml><?xml version="1.0" encoding="utf-8"?>
+<file path=ppt/slides/slide13.xml><?xml version="1.0" encoding="utf-8"?>
 <p:sld xmlns:a="http://schemas.openxmlformats.org/drawingml/2006/main" xmlns:r="http://schemas.openxmlformats.org/officeDocument/2006/relationships" xmlns:p="http://schemas.openxmlformats.org/presentationml/2006/main">
   <p:cSld>
     <p:spTree>
@@ -5845,7 +6460,7 @@
 </p:sld>
 </file>
 
-<file path=ppt/slides/slide13.xml><?xml version="1.0" encoding="utf-8"?>
+<file path=ppt/slides/slide14.xml><?xml version="1.0" encoding="utf-8"?>
 <p:sld xmlns:a="http://schemas.openxmlformats.org/drawingml/2006/main" xmlns:r="http://schemas.openxmlformats.org/officeDocument/2006/relationships" xmlns:p="http://schemas.openxmlformats.org/presentationml/2006/main">
   <p:cSld>
     <p:spTree>
@@ -6151,7 +6766,7 @@
 </p:sld>
 </file>
 
-<file path=ppt/slides/slide14.xml><?xml version="1.0" encoding="utf-8"?>
+<file path=ppt/slides/slide15.xml><?xml version="1.0" encoding="utf-8"?>
 <p:sld xmlns:a="http://schemas.openxmlformats.org/drawingml/2006/main" xmlns:r="http://schemas.openxmlformats.org/officeDocument/2006/relationships" xmlns:p="http://schemas.openxmlformats.org/presentationml/2006/main">
   <p:cSld>
     <p:spTree>
@@ -6689,7 +7304,7 @@
 </p:sld>
 </file>
 
-<file path=ppt/slides/slide15.xml><?xml version="1.0" encoding="utf-8"?>
+<file path=ppt/slides/slide16.xml><?xml version="1.0" encoding="utf-8"?>
 <p:sld xmlns:a="http://schemas.openxmlformats.org/drawingml/2006/main" xmlns:r="http://schemas.openxmlformats.org/officeDocument/2006/relationships" xmlns:p="http://schemas.openxmlformats.org/presentationml/2006/main">
   <p:cSld>
     <p:spTree>
@@ -7236,7 +7851,7 @@
 </p:sld>
 </file>
 
-<file path=ppt/slides/slide16.xml><?xml version="1.0" encoding="utf-8"?>
+<file path=ppt/slides/slide17.xml><?xml version="1.0" encoding="utf-8"?>
 <p:sld xmlns:a="http://schemas.openxmlformats.org/drawingml/2006/main" xmlns:r="http://schemas.openxmlformats.org/officeDocument/2006/relationships" xmlns:p="http://schemas.openxmlformats.org/presentationml/2006/main">
   <p:cSld>
     <p:spTree>
@@ -7729,7 +8344,7 @@
 </p:sld>
 </file>
 
-<file path=ppt/slides/slide17.xml><?xml version="1.0" encoding="utf-8"?>
+<file path=ppt/slides/slide18.xml><?xml version="1.0" encoding="utf-8"?>
 <p:sld xmlns:a="http://schemas.openxmlformats.org/drawingml/2006/main" xmlns:r="http://schemas.openxmlformats.org/officeDocument/2006/relationships" xmlns:p="http://schemas.openxmlformats.org/presentationml/2006/main">
   <p:cSld>
     <p:spTree>
@@ -8102,7 +8717,7 @@
 </p:sld>
 </file>
 
-<file path=ppt/slides/slide18.xml><?xml version="1.0" encoding="utf-8"?>
+<file path=ppt/slides/slide19.xml><?xml version="1.0" encoding="utf-8"?>
 <p:sld xmlns:a="http://schemas.openxmlformats.org/drawingml/2006/main" xmlns:r="http://schemas.openxmlformats.org/officeDocument/2006/relationships" xmlns:p="http://schemas.openxmlformats.org/presentationml/2006/main">
   <p:cSld>
     <p:spTree>
@@ -8446,258 +9061,6 @@
     <p:extLst>
       <p:ext uri="{BB962C8B-B14F-4D97-AF65-F5344CB8AC3E}">
         <p14:creationId xmlns:p14="http://schemas.microsoft.com/office/powerpoint/2010/main" val="1039163953"/>
-      </p:ext>
-    </p:extLst>
-  </p:cSld>
-  <p:clrMapOvr>
-    <a:masterClrMapping/>
-  </p:clrMapOvr>
-  <p:transition spd="med">
-    <p:strips dir="rd"/>
-  </p:transition>
-</p:sld>
-</file>
-
-<file path=ppt/slides/slide19.xml><?xml version="1.0" encoding="utf-8"?>
-<p:sld xmlns:a="http://schemas.openxmlformats.org/drawingml/2006/main" xmlns:r="http://schemas.openxmlformats.org/officeDocument/2006/relationships" xmlns:p="http://schemas.openxmlformats.org/presentationml/2006/main">
-  <p:cSld>
-    <p:spTree>
-      <p:nvGrpSpPr>
-        <p:cNvPr id="1" name=""/>
-        <p:cNvGrpSpPr/>
-        <p:nvPr/>
-      </p:nvGrpSpPr>
-      <p:grpSpPr>
-        <a:xfrm>
-          <a:off x="0" y="0"/>
-          <a:ext cx="0" cy="0"/>
-          <a:chOff x="0" y="0"/>
-          <a:chExt cx="0" cy="0"/>
-        </a:xfrm>
-      </p:grpSpPr>
-      <p:sp>
-        <p:nvSpPr>
-          <p:cNvPr id="2" name="Titre 1"/>
-          <p:cNvSpPr>
-            <a:spLocks noGrp="1"/>
-          </p:cNvSpPr>
-          <p:nvPr>
-            <p:ph type="title"/>
-          </p:nvPr>
-        </p:nvSpPr>
-        <p:spPr>
-          <a:xfrm>
-            <a:off x="457200" y="274638"/>
-            <a:ext cx="7620000" cy="1143000"/>
-          </a:xfrm>
-        </p:spPr>
-        <p:txBody>
-          <a:bodyPr/>
-          <a:lstStyle/>
-          <a:p>
-            <a:r>
-              <a:rPr lang="pt-BR" altLang="pt-BR" sz="4800" dirty="0">
-                <a:solidFill>
-                  <a:srgbClr val="333333"/>
-                </a:solidFill>
-              </a:rPr>
-              <a:t>Variogram</a:t>
-            </a:r>
-          </a:p>
-        </p:txBody>
-      </p:sp>
-      <p:sp>
-        <p:nvSpPr>
-          <p:cNvPr id="18" name="Footer Placeholder 4"/>
-          <p:cNvSpPr txBox="1">
-            <a:spLocks/>
-          </p:cNvSpPr>
-          <p:nvPr/>
-        </p:nvSpPr>
-        <p:spPr>
-          <a:xfrm rot="16200000">
-            <a:off x="7587456" y="4048919"/>
-            <a:ext cx="2366963" cy="365125"/>
-          </a:xfrm>
-          <a:prstGeom prst="rect">
-            <a:avLst/>
-          </a:prstGeom>
-        </p:spPr>
-        <p:txBody>
-          <a:bodyPr vert="horz" lIns="91440" tIns="45720" rIns="91440" bIns="45720" rtlCol="0" anchor="ctr"/>
-          <a:lstStyle>
-            <a:defPPr>
-              <a:defRPr lang="fr-BE"/>
-            </a:defPPr>
-            <a:lvl1pPr algn="ctr" rtl="0" fontAlgn="base">
-              <a:spcBef>
-                <a:spcPct val="0"/>
-              </a:spcBef>
-              <a:spcAft>
-                <a:spcPct val="0"/>
-              </a:spcAft>
-              <a:defRPr sz="1200" kern="1200" dirty="0" smtClean="0">
-                <a:solidFill>
-                  <a:schemeClr val="bg2"/>
-                </a:solidFill>
-                <a:latin typeface="Arial" charset="0"/>
-                <a:ea typeface="+mn-ea"/>
-                <a:cs typeface="Arial" charset="0"/>
-              </a:defRPr>
-            </a:lvl1pPr>
-            <a:lvl2pPr marL="457200" algn="ctr" rtl="0" fontAlgn="base">
-              <a:spcBef>
-                <a:spcPct val="0"/>
-              </a:spcBef>
-              <a:spcAft>
-                <a:spcPct val="0"/>
-              </a:spcAft>
-              <a:defRPr kern="1200">
-                <a:solidFill>
-                  <a:schemeClr val="tx1"/>
-                </a:solidFill>
-                <a:latin typeface="Arial" charset="0"/>
-                <a:ea typeface="+mn-ea"/>
-                <a:cs typeface="Arial" charset="0"/>
-              </a:defRPr>
-            </a:lvl2pPr>
-            <a:lvl3pPr marL="914400" algn="ctr" rtl="0" fontAlgn="base">
-              <a:spcBef>
-                <a:spcPct val="0"/>
-              </a:spcBef>
-              <a:spcAft>
-                <a:spcPct val="0"/>
-              </a:spcAft>
-              <a:defRPr kern="1200">
-                <a:solidFill>
-                  <a:schemeClr val="tx1"/>
-                </a:solidFill>
-                <a:latin typeface="Arial" charset="0"/>
-                <a:ea typeface="+mn-ea"/>
-                <a:cs typeface="Arial" charset="0"/>
-              </a:defRPr>
-            </a:lvl3pPr>
-            <a:lvl4pPr marL="1371600" algn="ctr" rtl="0" fontAlgn="base">
-              <a:spcBef>
-                <a:spcPct val="0"/>
-              </a:spcBef>
-              <a:spcAft>
-                <a:spcPct val="0"/>
-              </a:spcAft>
-              <a:defRPr kern="1200">
-                <a:solidFill>
-                  <a:schemeClr val="tx1"/>
-                </a:solidFill>
-                <a:latin typeface="Arial" charset="0"/>
-                <a:ea typeface="+mn-ea"/>
-                <a:cs typeface="Arial" charset="0"/>
-              </a:defRPr>
-            </a:lvl4pPr>
-            <a:lvl5pPr marL="1828800" algn="ctr" rtl="0" fontAlgn="base">
-              <a:spcBef>
-                <a:spcPct val="0"/>
-              </a:spcBef>
-              <a:spcAft>
-                <a:spcPct val="0"/>
-              </a:spcAft>
-              <a:defRPr kern="1200">
-                <a:solidFill>
-                  <a:schemeClr val="tx1"/>
-                </a:solidFill>
-                <a:latin typeface="Arial" charset="0"/>
-                <a:ea typeface="+mn-ea"/>
-                <a:cs typeface="Arial" charset="0"/>
-              </a:defRPr>
-            </a:lvl5pPr>
-            <a:lvl6pPr marL="2286000" algn="l" defTabSz="914400" rtl="0" eaLnBrk="1" latinLnBrk="0" hangingPunct="1">
-              <a:defRPr kern="1200">
-                <a:solidFill>
-                  <a:schemeClr val="tx1"/>
-                </a:solidFill>
-                <a:latin typeface="Arial" charset="0"/>
-                <a:ea typeface="+mn-ea"/>
-                <a:cs typeface="Arial" charset="0"/>
-              </a:defRPr>
-            </a:lvl6pPr>
-            <a:lvl7pPr marL="2743200" algn="l" defTabSz="914400" rtl="0" eaLnBrk="1" latinLnBrk="0" hangingPunct="1">
-              <a:defRPr kern="1200">
-                <a:solidFill>
-                  <a:schemeClr val="tx1"/>
-                </a:solidFill>
-                <a:latin typeface="Arial" charset="0"/>
-                <a:ea typeface="+mn-ea"/>
-                <a:cs typeface="Arial" charset="0"/>
-              </a:defRPr>
-            </a:lvl7pPr>
-            <a:lvl8pPr marL="3200400" algn="l" defTabSz="914400" rtl="0" eaLnBrk="1" latinLnBrk="0" hangingPunct="1">
-              <a:defRPr kern="1200">
-                <a:solidFill>
-                  <a:schemeClr val="tx1"/>
-                </a:solidFill>
-                <a:latin typeface="Arial" charset="0"/>
-                <a:ea typeface="+mn-ea"/>
-                <a:cs typeface="Arial" charset="0"/>
-              </a:defRPr>
-            </a:lvl8pPr>
-            <a:lvl9pPr marL="3657600" algn="l" defTabSz="914400" rtl="0" eaLnBrk="1" latinLnBrk="0" hangingPunct="1">
-              <a:defRPr kern="1200">
-                <a:solidFill>
-                  <a:schemeClr val="tx1"/>
-                </a:solidFill>
-                <a:latin typeface="Arial" charset="0"/>
-                <a:ea typeface="+mn-ea"/>
-                <a:cs typeface="Arial" charset="0"/>
-              </a:defRPr>
-            </a:lvl9pPr>
-          </a:lstStyle>
-          <a:p>
-            <a:pPr>
-              <a:defRPr/>
-            </a:pPr>
-            <a:r>
-              <a:rPr lang="fr-FR" dirty="0" err="1"/>
-              <a:t>Geostatistics</a:t>
-            </a:r>
-            <a:endParaRPr lang="fr-FR" dirty="0"/>
-          </a:p>
-        </p:txBody>
-      </p:sp>
-      <p:pic>
-        <p:nvPicPr>
-          <p:cNvPr id="4" name="Espaço Reservado para Conteúdo 3">
-            <a:extLst>
-              <a:ext uri="{FF2B5EF4-FFF2-40B4-BE49-F238E27FC236}">
-                <a16:creationId xmlns:a16="http://schemas.microsoft.com/office/drawing/2014/main" id="{316291C1-459A-4AA3-93EA-636A59705E11}"/>
-              </a:ext>
-            </a:extLst>
-          </p:cNvPr>
-          <p:cNvPicPr>
-            <a:picLocks noGrp="1" noChangeAspect="1"/>
-          </p:cNvPicPr>
-          <p:nvPr>
-            <p:ph idx="1"/>
-          </p:nvPr>
-        </p:nvPicPr>
-        <p:blipFill>
-          <a:blip r:embed="rId3"/>
-          <a:stretch>
-            <a:fillRect/>
-          </a:stretch>
-        </p:blipFill>
-        <p:spPr>
-          <a:xfrm>
-            <a:off x="2185950" y="1849240"/>
-            <a:ext cx="4162499" cy="4232106"/>
-          </a:xfrm>
-          <a:prstGeom prst="rect">
-            <a:avLst/>
-          </a:prstGeom>
-        </p:spPr>
-      </p:pic>
-    </p:spTree>
-    <p:extLst>
-      <p:ext uri="{BB962C8B-B14F-4D97-AF65-F5344CB8AC3E}">
-        <p14:creationId xmlns:p14="http://schemas.microsoft.com/office/powerpoint/2010/main" val="939995966"/>
       </p:ext>
     </p:extLst>
   </p:cSld>
@@ -11910,20 +12273,12 @@
           <a:lstStyle/>
           <a:p>
             <a:r>
-              <a:rPr lang="pt-BR" altLang="pt-BR" sz="4800" dirty="0" err="1">
+              <a:rPr lang="pt-BR" altLang="pt-BR" sz="4800" dirty="0">
                 <a:solidFill>
                   <a:srgbClr val="333333"/>
                 </a:solidFill>
               </a:rPr>
-              <a:t>Directional</a:t>
-            </a:r>
-            <a:r>
-              <a:rPr lang="pt-BR" altLang="pt-BR" sz="4800" dirty="0">
-                <a:solidFill>
-                  <a:srgbClr val="333333"/>
-                </a:solidFill>
-              </a:rPr>
-              <a:t> variogram</a:t>
+              <a:t>Variogram</a:t>
             </a:r>
           </a:p>
         </p:txBody>
@@ -12084,91 +12439,21 @@
           </a:p>
         </p:txBody>
       </p:sp>
-      <p:sp>
-        <p:nvSpPr>
+      <p:pic>
+        <p:nvPicPr>
           <p:cNvPr id="4" name="Espaço Reservado para Conteúdo 3">
             <a:extLst>
               <a:ext uri="{FF2B5EF4-FFF2-40B4-BE49-F238E27FC236}">
-                <a16:creationId xmlns:a16="http://schemas.microsoft.com/office/drawing/2014/main" id="{C81EE1C5-4E52-4EF2-B1DD-BA135106C3BB}"/>
-              </a:ext>
-            </a:extLst>
-          </p:cNvPr>
-          <p:cNvSpPr>
-            <a:spLocks noGrp="1"/>
-          </p:cNvSpPr>
-          <p:nvPr>
-            <p:ph idx="1"/>
-          </p:nvPr>
-        </p:nvSpPr>
-        <p:spPr>
-          <a:xfrm>
-            <a:off x="457200" y="1600200"/>
-            <a:ext cx="7620000" cy="5257800"/>
-          </a:xfrm>
-        </p:spPr>
-        <p:txBody>
-          <a:bodyPr/>
-          <a:lstStyle/>
-          <a:p>
-            <a:endParaRPr lang="en-US" i="1" dirty="0"/>
-          </a:p>
-          <a:p>
-            <a:r>
-              <a:rPr lang="en-US" i="1" dirty="0"/>
-              <a:t>γ</a:t>
-            </a:r>
-            <a:r>
-              <a:rPr lang="en-US" dirty="0"/>
-              <a:t>(</a:t>
-            </a:r>
-            <a:r>
-              <a:rPr lang="en-US" b="1" dirty="0"/>
-              <a:t>h</a:t>
-            </a:r>
-            <a:r>
-              <a:rPr lang="en-US" dirty="0"/>
-              <a:t>) = </a:t>
-            </a:r>
-            <a:r>
-              <a:rPr lang="el-GR" dirty="0"/>
-              <a:t>γ</a:t>
-            </a:r>
-            <a:r>
-              <a:rPr lang="en-US" i="1" dirty="0"/>
-              <a:t>(-</a:t>
-            </a:r>
-            <a:r>
-              <a:rPr lang="en-US" b="1" dirty="0"/>
-              <a:t>h</a:t>
-            </a:r>
-            <a:r>
-              <a:rPr lang="en-US" dirty="0"/>
-              <a:t>)  0 (Symmetry)</a:t>
-            </a:r>
-            <a:endParaRPr lang="pt-BR" dirty="0"/>
-          </a:p>
-          <a:p>
-            <a:endParaRPr lang="pt-BR" altLang="pt-BR" sz="2000" dirty="0">
-              <a:solidFill>
-                <a:schemeClr val="tx1"/>
-              </a:solidFill>
-            </a:endParaRPr>
-          </a:p>
-        </p:txBody>
-      </p:sp>
-      <p:pic>
-        <p:nvPicPr>
-          <p:cNvPr id="6" name="Espaço Reservado para Conteúdo 2">
-            <a:extLst>
-              <a:ext uri="{FF2B5EF4-FFF2-40B4-BE49-F238E27FC236}">
-                <a16:creationId xmlns:a16="http://schemas.microsoft.com/office/drawing/2014/main" id="{2B23E4C8-7064-44A6-91C0-2DA76EEA386B}"/>
+                <a16:creationId xmlns:a16="http://schemas.microsoft.com/office/drawing/2014/main" id="{316291C1-459A-4AA3-93EA-636A59705E11}"/>
               </a:ext>
             </a:extLst>
           </p:cNvPr>
           <p:cNvPicPr>
-            <a:picLocks noChangeAspect="1"/>
+            <a:picLocks noGrp="1" noChangeAspect="1"/>
           </p:cNvPicPr>
-          <p:nvPr/>
+          <p:nvPr>
+            <p:ph idx="1"/>
+          </p:nvPr>
         </p:nvPicPr>
         <p:blipFill>
           <a:blip r:embed="rId3"/>
@@ -12176,43 +12461,20 @@
             <a:fillRect/>
           </a:stretch>
         </p:blipFill>
-        <p:spPr bwMode="auto">
+        <p:spPr>
           <a:xfrm>
-            <a:off x="574583" y="2747493"/>
-            <a:ext cx="7136567" cy="3503405"/>
+            <a:off x="2185950" y="1849240"/>
+            <a:ext cx="4162499" cy="4232106"/>
           </a:xfrm>
           <a:prstGeom prst="rect">
             <a:avLst/>
           </a:prstGeom>
-          <a:noFill/>
-          <a:ln>
-            <a:noFill/>
-          </a:ln>
-          <a:extLst>
-            <a:ext uri="{909E8E84-426E-40DD-AFC4-6F175D3DCCD1}">
-              <a14:hiddenFill xmlns:a14="http://schemas.microsoft.com/office/drawing/2010/main">
-                <a:solidFill>
-                  <a:srgbClr val="FFFFFF"/>
-                </a:solidFill>
-              </a14:hiddenFill>
-            </a:ext>
-            <a:ext uri="{91240B29-F687-4F45-9708-019B960494DF}">
-              <a14:hiddenLine xmlns:a14="http://schemas.microsoft.com/office/drawing/2010/main" w="9525">
-                <a:solidFill>
-                  <a:srgbClr val="000000"/>
-                </a:solidFill>
-                <a:miter lim="800000"/>
-                <a:headEnd/>
-                <a:tailEnd/>
-              </a14:hiddenLine>
-            </a:ext>
-          </a:extLst>
         </p:spPr>
       </p:pic>
     </p:spTree>
     <p:extLst>
       <p:ext uri="{BB962C8B-B14F-4D97-AF65-F5344CB8AC3E}">
-        <p14:creationId xmlns:p14="http://schemas.microsoft.com/office/powerpoint/2010/main" val="1775445024"/>
+        <p14:creationId xmlns:p14="http://schemas.microsoft.com/office/powerpoint/2010/main" val="939995966"/>
       </p:ext>
     </p:extLst>
   </p:cSld>

</xml_diff>